<commit_message>
updates the 2nd presentation
</commit_message>
<xml_diff>
--- a/Sprint1.pptx
+++ b/Sprint1.pptx
@@ -114,6 +114,22 @@
       </a:defRPr>
     </a:lvl9pPr>
   </p:defaultTextStyle>
+  <p:extLst>
+    <p:ext uri="{EFAFB233-063F-42B5-8137-9DF3F51BA10A}">
+      <p15:sldGuideLst xmlns:p15="http://schemas.microsoft.com/office/powerpoint/2012/main">
+        <p15:guide id="1" orient="horz" pos="2160">
+          <p15:clr>
+            <a:srgbClr val="A4A3A4"/>
+          </p15:clr>
+        </p15:guide>
+        <p15:guide id="2" pos="3840">
+          <p15:clr>
+            <a:srgbClr val="A4A3A4"/>
+          </p15:clr>
+        </p15:guide>
+      </p15:sldGuideLst>
+    </p:ext>
+  </p:extLst>
 </p:presentation>
 </file>
 
@@ -147,7 +163,7 @@
             <a:alphaModFix amt="30000"/>
             <a:extLst>
               <a:ext uri="{28A0092B-C50C-407E-A947-70E740481C1C}">
-                <a14:useLocalDpi xmlns:a14="http://schemas.microsoft.com/office/drawing/2010/main" xmlns="" val="0"/>
+                <a14:useLocalDpi xmlns:a14="http://schemas.microsoft.com/office/drawing/2010/main" val="0"/>
               </a:ext>
             </a:extLst>
           </a:blip>
@@ -167,7 +183,7 @@
           <a:noFill/>
           <a:extLst>
             <a:ext uri="{909E8E84-426E-40dd-AFC4-6F175D3DCCD1}">
-              <a14:hiddenFill xmlns="" xmlns:a14="http://schemas.microsoft.com/office/drawing/2010/main">
+              <a14:hiddenFill xmlns:a14="http://schemas.microsoft.com/office/drawing/2010/main" xmlns="">
                 <a:solidFill>
                   <a:srgbClr val="FFFFFF"/>
                 </a:solidFill>
@@ -227,7 +243,7 @@
             </a:ln>
             <a:extLst>
               <a:ext uri="{91240B29-F687-4f45-9708-019B960494DF}">
-                <a14:hiddenLine xmlns="" xmlns:a14="http://schemas.microsoft.com/office/drawing/2010/main" w="9525">
+                <a14:hiddenLine xmlns:a14="http://schemas.microsoft.com/office/drawing/2010/main" xmlns="" w="9525">
                   <a:solidFill>
                     <a:srgbClr val="000000"/>
                   </a:solidFill>
@@ -317,7 +333,7 @@
             </a:ln>
             <a:extLst>
               <a:ext uri="{91240B29-F687-4f45-9708-019B960494DF}">
-                <a14:hiddenLine xmlns="" xmlns:a14="http://schemas.microsoft.com/office/drawing/2010/main" w="9525">
+                <a14:hiddenLine xmlns:a14="http://schemas.microsoft.com/office/drawing/2010/main" xmlns="" w="9525">
                   <a:solidFill>
                     <a:srgbClr val="000000"/>
                   </a:solidFill>
@@ -407,7 +423,7 @@
             </a:ln>
             <a:extLst>
               <a:ext uri="{91240B29-F687-4f45-9708-019B960494DF}">
-                <a14:hiddenLine xmlns="" xmlns:a14="http://schemas.microsoft.com/office/drawing/2010/main" w="9525">
+                <a14:hiddenLine xmlns:a14="http://schemas.microsoft.com/office/drawing/2010/main" xmlns="" w="9525">
                   <a:solidFill>
                     <a:srgbClr val="000000"/>
                   </a:solidFill>
@@ -441,7 +457,7 @@
             </a:ln>
             <a:extLst>
               <a:ext uri="{91240B29-F687-4f45-9708-019B960494DF}">
-                <a14:hiddenLine xmlns="" xmlns:a14="http://schemas.microsoft.com/office/drawing/2010/main" w="9525">
+                <a14:hiddenLine xmlns:a14="http://schemas.microsoft.com/office/drawing/2010/main" xmlns="" w="9525">
                   <a:solidFill>
                     <a:srgbClr val="000000"/>
                   </a:solidFill>
@@ -531,7 +547,7 @@
             </a:ln>
             <a:extLst>
               <a:ext uri="{91240B29-F687-4f45-9708-019B960494DF}">
-                <a14:hiddenLine xmlns="" xmlns:a14="http://schemas.microsoft.com/office/drawing/2010/main" w="9525">
+                <a14:hiddenLine xmlns:a14="http://schemas.microsoft.com/office/drawing/2010/main" xmlns="" w="9525">
                   <a:solidFill>
                     <a:srgbClr val="000000"/>
                   </a:solidFill>
@@ -593,7 +609,7 @@
             </a:ln>
             <a:extLst>
               <a:ext uri="{91240B29-F687-4f45-9708-019B960494DF}">
-                <a14:hiddenLine xmlns="" xmlns:a14="http://schemas.microsoft.com/office/drawing/2010/main" w="9525">
+                <a14:hiddenLine xmlns:a14="http://schemas.microsoft.com/office/drawing/2010/main" xmlns="" w="9525">
                   <a:solidFill>
                     <a:srgbClr val="000000"/>
                   </a:solidFill>
@@ -655,7 +671,7 @@
             </a:ln>
             <a:extLst>
               <a:ext uri="{91240B29-F687-4f45-9708-019B960494DF}">
-                <a14:hiddenLine xmlns="" xmlns:a14="http://schemas.microsoft.com/office/drawing/2010/main" w="9525">
+                <a14:hiddenLine xmlns:a14="http://schemas.microsoft.com/office/drawing/2010/main" xmlns="" w="9525">
                   <a:solidFill>
                     <a:srgbClr val="000000"/>
                   </a:solidFill>
@@ -745,7 +761,7 @@
             </a:ln>
             <a:extLst>
               <a:ext uri="{91240B29-F687-4f45-9708-019B960494DF}">
-                <a14:hiddenLine xmlns="" xmlns:a14="http://schemas.microsoft.com/office/drawing/2010/main" w="9525">
+                <a14:hiddenLine xmlns:a14="http://schemas.microsoft.com/office/drawing/2010/main" xmlns="" w="9525">
                   <a:solidFill>
                     <a:srgbClr val="000000"/>
                   </a:solidFill>
@@ -807,7 +823,7 @@
             </a:ln>
             <a:extLst>
               <a:ext uri="{91240B29-F687-4f45-9708-019B960494DF}">
-                <a14:hiddenLine xmlns="" xmlns:a14="http://schemas.microsoft.com/office/drawing/2010/main" w="9525">
+                <a14:hiddenLine xmlns:a14="http://schemas.microsoft.com/office/drawing/2010/main" xmlns="" w="9525">
                   <a:solidFill>
                     <a:srgbClr val="000000"/>
                   </a:solidFill>
@@ -869,7 +885,7 @@
             </a:ln>
             <a:extLst>
               <a:ext uri="{91240B29-F687-4f45-9708-019B960494DF}">
-                <a14:hiddenLine xmlns="" xmlns:a14="http://schemas.microsoft.com/office/drawing/2010/main" w="9525">
+                <a14:hiddenLine xmlns:a14="http://schemas.microsoft.com/office/drawing/2010/main" xmlns="" w="9525">
                   <a:solidFill>
                     <a:srgbClr val="000000"/>
                   </a:solidFill>
@@ -959,7 +975,7 @@
             </a:ln>
             <a:extLst>
               <a:ext uri="{91240B29-F687-4f45-9708-019B960494DF}">
-                <a14:hiddenLine xmlns="" xmlns:a14="http://schemas.microsoft.com/office/drawing/2010/main" w="9525">
+                <a14:hiddenLine xmlns:a14="http://schemas.microsoft.com/office/drawing/2010/main" xmlns="" w="9525">
                   <a:solidFill>
                     <a:srgbClr val="000000"/>
                   </a:solidFill>
@@ -1049,7 +1065,7 @@
             </a:ln>
             <a:extLst>
               <a:ext uri="{91240B29-F687-4f45-9708-019B960494DF}">
-                <a14:hiddenLine xmlns="" xmlns:a14="http://schemas.microsoft.com/office/drawing/2010/main" w="9525">
+                <a14:hiddenLine xmlns:a14="http://schemas.microsoft.com/office/drawing/2010/main" xmlns="" w="9525">
                   <a:solidFill>
                     <a:srgbClr val="000000"/>
                   </a:solidFill>
@@ -1111,7 +1127,7 @@
             </a:ln>
             <a:extLst>
               <a:ext uri="{91240B29-F687-4f45-9708-019B960494DF}">
-                <a14:hiddenLine xmlns="" xmlns:a14="http://schemas.microsoft.com/office/drawing/2010/main" w="9525">
+                <a14:hiddenLine xmlns:a14="http://schemas.microsoft.com/office/drawing/2010/main" xmlns="" w="9525">
                   <a:solidFill>
                     <a:srgbClr val="000000"/>
                   </a:solidFill>
@@ -1221,7 +1237,7 @@
             </a:ln>
             <a:extLst>
               <a:ext uri="{91240B29-F687-4f45-9708-019B960494DF}">
-                <a14:hiddenLine xmlns="" xmlns:a14="http://schemas.microsoft.com/office/drawing/2010/main" w="9525">
+                <a14:hiddenLine xmlns:a14="http://schemas.microsoft.com/office/drawing/2010/main" xmlns="" w="9525">
                   <a:solidFill>
                     <a:srgbClr val="000000"/>
                   </a:solidFill>
@@ -1283,7 +1299,7 @@
             </a:ln>
             <a:extLst>
               <a:ext uri="{91240B29-F687-4f45-9708-019B960494DF}">
-                <a14:hiddenLine xmlns="" xmlns:a14="http://schemas.microsoft.com/office/drawing/2010/main" w="9525">
+                <a14:hiddenLine xmlns:a14="http://schemas.microsoft.com/office/drawing/2010/main" xmlns="" w="9525">
                   <a:solidFill>
                     <a:srgbClr val="000000"/>
                   </a:solidFill>
@@ -1373,7 +1389,7 @@
             </a:ln>
             <a:extLst>
               <a:ext uri="{91240B29-F687-4f45-9708-019B960494DF}">
-                <a14:hiddenLine xmlns="" xmlns:a14="http://schemas.microsoft.com/office/drawing/2010/main" w="9525">
+                <a14:hiddenLine xmlns:a14="http://schemas.microsoft.com/office/drawing/2010/main" xmlns="" w="9525">
                   <a:solidFill>
                     <a:srgbClr val="000000"/>
                   </a:solidFill>
@@ -1463,7 +1479,7 @@
             </a:ln>
             <a:extLst>
               <a:ext uri="{91240B29-F687-4f45-9708-019B960494DF}">
-                <a14:hiddenLine xmlns="" xmlns:a14="http://schemas.microsoft.com/office/drawing/2010/main" w="9525">
+                <a14:hiddenLine xmlns:a14="http://schemas.microsoft.com/office/drawing/2010/main" xmlns="" w="9525">
                   <a:solidFill>
                     <a:srgbClr val="000000"/>
                   </a:solidFill>
@@ -1525,7 +1541,7 @@
             </a:ln>
             <a:extLst>
               <a:ext uri="{91240B29-F687-4f45-9708-019B960494DF}">
-                <a14:hiddenLine xmlns="" xmlns:a14="http://schemas.microsoft.com/office/drawing/2010/main" w="9525">
+                <a14:hiddenLine xmlns:a14="http://schemas.microsoft.com/office/drawing/2010/main" xmlns="" w="9525">
                   <a:solidFill>
                     <a:srgbClr val="000000"/>
                   </a:solidFill>
@@ -1615,7 +1631,7 @@
             </a:ln>
             <a:extLst>
               <a:ext uri="{91240B29-F687-4f45-9708-019B960494DF}">
-                <a14:hiddenLine xmlns="" xmlns:a14="http://schemas.microsoft.com/office/drawing/2010/main" w="9525">
+                <a14:hiddenLine xmlns:a14="http://schemas.microsoft.com/office/drawing/2010/main" xmlns="" w="9525">
                   <a:solidFill>
                     <a:srgbClr val="000000"/>
                   </a:solidFill>
@@ -1705,7 +1721,7 @@
             </a:ln>
             <a:extLst>
               <a:ext uri="{91240B29-F687-4f45-9708-019B960494DF}">
-                <a14:hiddenLine xmlns="" xmlns:a14="http://schemas.microsoft.com/office/drawing/2010/main" w="9525">
+                <a14:hiddenLine xmlns:a14="http://schemas.microsoft.com/office/drawing/2010/main" xmlns="" w="9525">
                   <a:solidFill>
                     <a:srgbClr val="000000"/>
                   </a:solidFill>
@@ -1761,7 +1777,7 @@
             </a:ln>
             <a:extLst>
               <a:ext uri="{91240B29-F687-4f45-9708-019B960494DF}">
-                <a14:hiddenLine xmlns="" xmlns:a14="http://schemas.microsoft.com/office/drawing/2010/main" w="9525">
+                <a14:hiddenLine xmlns:a14="http://schemas.microsoft.com/office/drawing/2010/main" xmlns="" w="9525">
                   <a:solidFill>
                     <a:srgbClr val="000000"/>
                   </a:solidFill>
@@ -1851,7 +1867,7 @@
             </a:ln>
             <a:extLst>
               <a:ext uri="{91240B29-F687-4f45-9708-019B960494DF}">
-                <a14:hiddenLine xmlns="" xmlns:a14="http://schemas.microsoft.com/office/drawing/2010/main" w="9525">
+                <a14:hiddenLine xmlns:a14="http://schemas.microsoft.com/office/drawing/2010/main" xmlns="" w="9525">
                   <a:solidFill>
                     <a:srgbClr val="000000"/>
                   </a:solidFill>
@@ -1907,7 +1923,7 @@
             </a:ln>
             <a:extLst>
               <a:ext uri="{91240B29-F687-4f45-9708-019B960494DF}">
-                <a14:hiddenLine xmlns="" xmlns:a14="http://schemas.microsoft.com/office/drawing/2010/main" w="9525">
+                <a14:hiddenLine xmlns:a14="http://schemas.microsoft.com/office/drawing/2010/main" xmlns="" w="9525">
                   <a:solidFill>
                     <a:srgbClr val="000000"/>
                   </a:solidFill>
@@ -1997,7 +2013,7 @@
             </a:ln>
             <a:extLst>
               <a:ext uri="{91240B29-F687-4f45-9708-019B960494DF}">
-                <a14:hiddenLine xmlns="" xmlns:a14="http://schemas.microsoft.com/office/drawing/2010/main" w="9525">
+                <a14:hiddenLine xmlns:a14="http://schemas.microsoft.com/office/drawing/2010/main" xmlns="" w="9525">
                   <a:solidFill>
                     <a:srgbClr val="000000"/>
                   </a:solidFill>
@@ -2065,7 +2081,7 @@
             </a:ln>
             <a:extLst>
               <a:ext uri="{91240B29-F687-4f45-9708-019B960494DF}">
-                <a14:hiddenLine xmlns="" xmlns:a14="http://schemas.microsoft.com/office/drawing/2010/main" w="9525">
+                <a14:hiddenLine xmlns:a14="http://schemas.microsoft.com/office/drawing/2010/main" xmlns="" w="9525">
                   <a:solidFill>
                     <a:srgbClr val="000000"/>
                   </a:solidFill>
@@ -2155,7 +2171,7 @@
             </a:ln>
             <a:extLst>
               <a:ext uri="{91240B29-F687-4f45-9708-019B960494DF}">
-                <a14:hiddenLine xmlns="" xmlns:a14="http://schemas.microsoft.com/office/drawing/2010/main" w="9525">
+                <a14:hiddenLine xmlns:a14="http://schemas.microsoft.com/office/drawing/2010/main" xmlns="" w="9525">
                   <a:solidFill>
                     <a:srgbClr val="000000"/>
                   </a:solidFill>
@@ -2223,7 +2239,7 @@
             </a:ln>
             <a:extLst>
               <a:ext uri="{91240B29-F687-4f45-9708-019B960494DF}">
-                <a14:hiddenLine xmlns="" xmlns:a14="http://schemas.microsoft.com/office/drawing/2010/main" w="9525">
+                <a14:hiddenLine xmlns:a14="http://schemas.microsoft.com/office/drawing/2010/main" xmlns="" w="9525">
                   <a:solidFill>
                     <a:srgbClr val="000000"/>
                   </a:solidFill>
@@ -2313,7 +2329,7 @@
             </a:ln>
             <a:extLst>
               <a:ext uri="{91240B29-F687-4f45-9708-019B960494DF}">
-                <a14:hiddenLine xmlns="" xmlns:a14="http://schemas.microsoft.com/office/drawing/2010/main" w="9525">
+                <a14:hiddenLine xmlns:a14="http://schemas.microsoft.com/office/drawing/2010/main" xmlns="" w="9525">
                   <a:solidFill>
                     <a:srgbClr val="000000"/>
                   </a:solidFill>
@@ -2347,7 +2363,7 @@
             </a:ln>
             <a:extLst>
               <a:ext uri="{91240B29-F687-4f45-9708-019B960494DF}">
-                <a14:hiddenLine xmlns="" xmlns:a14="http://schemas.microsoft.com/office/drawing/2010/main" w="9525">
+                <a14:hiddenLine xmlns:a14="http://schemas.microsoft.com/office/drawing/2010/main" xmlns="" w="9525">
                   <a:solidFill>
                     <a:srgbClr val="000000"/>
                   </a:solidFill>
@@ -2437,7 +2453,7 @@
             </a:ln>
             <a:extLst>
               <a:ext uri="{91240B29-F687-4f45-9708-019B960494DF}">
-                <a14:hiddenLine xmlns="" xmlns:a14="http://schemas.microsoft.com/office/drawing/2010/main" w="9525">
+                <a14:hiddenLine xmlns:a14="http://schemas.microsoft.com/office/drawing/2010/main" xmlns="" w="9525">
                   <a:solidFill>
                     <a:srgbClr val="000000"/>
                   </a:solidFill>
@@ -2499,7 +2515,7 @@
             </a:ln>
             <a:extLst>
               <a:ext uri="{91240B29-F687-4f45-9708-019B960494DF}">
-                <a14:hiddenLine xmlns="" xmlns:a14="http://schemas.microsoft.com/office/drawing/2010/main" w="9525">
+                <a14:hiddenLine xmlns:a14="http://schemas.microsoft.com/office/drawing/2010/main" xmlns="" w="9525">
                   <a:solidFill>
                     <a:srgbClr val="000000"/>
                   </a:solidFill>
@@ -2561,7 +2577,7 @@
             </a:ln>
             <a:extLst>
               <a:ext uri="{91240B29-F687-4f45-9708-019B960494DF}">
-                <a14:hiddenLine xmlns="" xmlns:a14="http://schemas.microsoft.com/office/drawing/2010/main" w="9525">
+                <a14:hiddenLine xmlns:a14="http://schemas.microsoft.com/office/drawing/2010/main" xmlns="" w="9525">
                   <a:solidFill>
                     <a:srgbClr val="000000"/>
                   </a:solidFill>
@@ -2651,7 +2667,7 @@
             </a:ln>
             <a:extLst>
               <a:ext uri="{91240B29-F687-4f45-9708-019B960494DF}">
-                <a14:hiddenLine xmlns="" xmlns:a14="http://schemas.microsoft.com/office/drawing/2010/main" w="9525">
+                <a14:hiddenLine xmlns:a14="http://schemas.microsoft.com/office/drawing/2010/main" xmlns="" w="9525">
                   <a:solidFill>
                     <a:srgbClr val="000000"/>
                   </a:solidFill>
@@ -2719,7 +2735,7 @@
             </a:ln>
             <a:extLst>
               <a:ext uri="{91240B29-F687-4f45-9708-019B960494DF}">
-                <a14:hiddenLine xmlns="" xmlns:a14="http://schemas.microsoft.com/office/drawing/2010/main" w="9525">
+                <a14:hiddenLine xmlns:a14="http://schemas.microsoft.com/office/drawing/2010/main" xmlns="" w="9525">
                   <a:solidFill>
                     <a:srgbClr val="000000"/>
                   </a:solidFill>
@@ -2781,7 +2797,7 @@
             </a:ln>
             <a:extLst>
               <a:ext uri="{91240B29-F687-4f45-9708-019B960494DF}">
-                <a14:hiddenLine xmlns="" xmlns:a14="http://schemas.microsoft.com/office/drawing/2010/main" w="9525">
+                <a14:hiddenLine xmlns:a14="http://schemas.microsoft.com/office/drawing/2010/main" xmlns="" w="9525">
                   <a:solidFill>
                     <a:srgbClr val="000000"/>
                   </a:solidFill>
@@ -2871,7 +2887,7 @@
             </a:ln>
             <a:extLst>
               <a:ext uri="{91240B29-F687-4f45-9708-019B960494DF}">
-                <a14:hiddenLine xmlns="" xmlns:a14="http://schemas.microsoft.com/office/drawing/2010/main" w="9525">
+                <a14:hiddenLine xmlns:a14="http://schemas.microsoft.com/office/drawing/2010/main" xmlns="" w="9525">
                   <a:solidFill>
                     <a:srgbClr val="000000"/>
                   </a:solidFill>
@@ -2933,7 +2949,7 @@
             </a:ln>
             <a:extLst>
               <a:ext uri="{91240B29-F687-4f45-9708-019B960494DF}">
-                <a14:hiddenLine xmlns="" xmlns:a14="http://schemas.microsoft.com/office/drawing/2010/main" w="9525">
+                <a14:hiddenLine xmlns:a14="http://schemas.microsoft.com/office/drawing/2010/main" xmlns="" w="9525">
                   <a:solidFill>
                     <a:srgbClr val="000000"/>
                   </a:solidFill>
@@ -3023,7 +3039,7 @@
             </a:ln>
             <a:extLst>
               <a:ext uri="{91240B29-F687-4f45-9708-019B960494DF}">
-                <a14:hiddenLine xmlns="" xmlns:a14="http://schemas.microsoft.com/office/drawing/2010/main" w="9525">
+                <a14:hiddenLine xmlns:a14="http://schemas.microsoft.com/office/drawing/2010/main" xmlns="" w="9525">
                   <a:solidFill>
                     <a:srgbClr val="000000"/>
                   </a:solidFill>
@@ -3085,7 +3101,7 @@
             </a:ln>
             <a:extLst>
               <a:ext uri="{91240B29-F687-4f45-9708-019B960494DF}">
-                <a14:hiddenLine xmlns="" xmlns:a14="http://schemas.microsoft.com/office/drawing/2010/main" w="9525">
+                <a14:hiddenLine xmlns:a14="http://schemas.microsoft.com/office/drawing/2010/main" xmlns="" w="9525">
                   <a:solidFill>
                     <a:srgbClr val="000000"/>
                   </a:solidFill>
@@ -3175,7 +3191,7 @@
             </a:ln>
             <a:extLst>
               <a:ext uri="{91240B29-F687-4f45-9708-019B960494DF}">
-                <a14:hiddenLine xmlns="" xmlns:a14="http://schemas.microsoft.com/office/drawing/2010/main" w="9525">
+                <a14:hiddenLine xmlns:a14="http://schemas.microsoft.com/office/drawing/2010/main" xmlns="" w="9525">
                   <a:solidFill>
                     <a:srgbClr val="000000"/>
                   </a:solidFill>
@@ -3209,7 +3225,7 @@
             </a:ln>
             <a:extLst>
               <a:ext uri="{91240B29-F687-4f45-9708-019B960494DF}">
-                <a14:hiddenLine xmlns="" xmlns:a14="http://schemas.microsoft.com/office/drawing/2010/main" w="9525">
+                <a14:hiddenLine xmlns:a14="http://schemas.microsoft.com/office/drawing/2010/main" xmlns="" w="9525">
                   <a:solidFill>
                     <a:srgbClr val="000000"/>
                   </a:solidFill>
@@ -3274,7 +3290,7 @@
             </a:ln>
             <a:extLst>
               <a:ext uri="{91240B29-F687-4f45-9708-019B960494DF}">
-                <a14:hiddenLine xmlns="" xmlns:a14="http://schemas.microsoft.com/office/drawing/2010/main" w="9525">
+                <a14:hiddenLine xmlns:a14="http://schemas.microsoft.com/office/drawing/2010/main" xmlns="" w="9525">
                   <a:solidFill>
                     <a:srgbClr val="000000"/>
                   </a:solidFill>
@@ -3364,7 +3380,7 @@
             </a:ln>
             <a:extLst>
               <a:ext uri="{91240B29-F687-4f45-9708-019B960494DF}">
-                <a14:hiddenLine xmlns="" xmlns:a14="http://schemas.microsoft.com/office/drawing/2010/main" w="9525">
+                <a14:hiddenLine xmlns:a14="http://schemas.microsoft.com/office/drawing/2010/main" xmlns="" w="9525">
                   <a:solidFill>
                     <a:srgbClr val="000000"/>
                   </a:solidFill>
@@ -3426,7 +3442,7 @@
             </a:ln>
             <a:extLst>
               <a:ext uri="{91240B29-F687-4f45-9708-019B960494DF}">
-                <a14:hiddenLine xmlns="" xmlns:a14="http://schemas.microsoft.com/office/drawing/2010/main" w="9525">
+                <a14:hiddenLine xmlns:a14="http://schemas.microsoft.com/office/drawing/2010/main" xmlns="" w="9525">
                   <a:solidFill>
                     <a:srgbClr val="000000"/>
                   </a:solidFill>
@@ -3516,7 +3532,7 @@
             </a:ln>
             <a:extLst>
               <a:ext uri="{91240B29-F687-4f45-9708-019B960494DF}">
-                <a14:hiddenLine xmlns="" xmlns:a14="http://schemas.microsoft.com/office/drawing/2010/main" w="9525">
+                <a14:hiddenLine xmlns:a14="http://schemas.microsoft.com/office/drawing/2010/main" xmlns="" w="9525">
                   <a:solidFill>
                     <a:srgbClr val="000000"/>
                   </a:solidFill>
@@ -3606,7 +3622,7 @@
             </a:ln>
             <a:extLst>
               <a:ext uri="{91240B29-F687-4f45-9708-019B960494DF}">
-                <a14:hiddenLine xmlns="" xmlns:a14="http://schemas.microsoft.com/office/drawing/2010/main" w="9525">
+                <a14:hiddenLine xmlns:a14="http://schemas.microsoft.com/office/drawing/2010/main" xmlns="" w="9525">
                   <a:solidFill>
                     <a:srgbClr val="000000"/>
                   </a:solidFill>
@@ -3671,7 +3687,7 @@
             </a:ln>
             <a:extLst>
               <a:ext uri="{91240B29-F687-4f45-9708-019B960494DF}">
-                <a14:hiddenLine xmlns="" xmlns:a14="http://schemas.microsoft.com/office/drawing/2010/main" w="9525">
+                <a14:hiddenLine xmlns:a14="http://schemas.microsoft.com/office/drawing/2010/main" xmlns="" w="9525">
                   <a:solidFill>
                     <a:srgbClr val="000000"/>
                   </a:solidFill>
@@ -3733,7 +3749,7 @@
             </a:ln>
             <a:extLst>
               <a:ext uri="{91240B29-F687-4f45-9708-019B960494DF}">
-                <a14:hiddenLine xmlns="" xmlns:a14="http://schemas.microsoft.com/office/drawing/2010/main" w="9525">
+                <a14:hiddenLine xmlns:a14="http://schemas.microsoft.com/office/drawing/2010/main" xmlns="" w="9525">
                   <a:solidFill>
                     <a:srgbClr val="000000"/>
                   </a:solidFill>
@@ -3823,7 +3839,7 @@
             </a:ln>
             <a:extLst>
               <a:ext uri="{91240B29-F687-4f45-9708-019B960494DF}">
-                <a14:hiddenLine xmlns="" xmlns:a14="http://schemas.microsoft.com/office/drawing/2010/main" w="9525">
+                <a14:hiddenLine xmlns:a14="http://schemas.microsoft.com/office/drawing/2010/main" xmlns="" w="9525">
                   <a:solidFill>
                     <a:srgbClr val="000000"/>
                   </a:solidFill>
@@ -3913,7 +3929,7 @@
             </a:ln>
             <a:extLst>
               <a:ext uri="{91240B29-F687-4f45-9708-019B960494DF}">
-                <a14:hiddenLine xmlns="" xmlns:a14="http://schemas.microsoft.com/office/drawing/2010/main" w="9525">
+                <a14:hiddenLine xmlns:a14="http://schemas.microsoft.com/office/drawing/2010/main" xmlns="" w="9525">
                   <a:solidFill>
                     <a:srgbClr val="000000"/>
                   </a:solidFill>
@@ -3975,7 +3991,7 @@
             </a:ln>
             <a:extLst>
               <a:ext uri="{91240B29-F687-4f45-9708-019B960494DF}">
-                <a14:hiddenLine xmlns="" xmlns:a14="http://schemas.microsoft.com/office/drawing/2010/main" w="9525">
+                <a14:hiddenLine xmlns:a14="http://schemas.microsoft.com/office/drawing/2010/main" xmlns="" w="9525">
                   <a:solidFill>
                     <a:srgbClr val="000000"/>
                   </a:solidFill>
@@ -4095,7 +4111,7 @@
             </a:ln>
             <a:extLst>
               <a:ext uri="{91240B29-F687-4f45-9708-019B960494DF}">
-                <a14:hiddenLine xmlns="" xmlns:a14="http://schemas.microsoft.com/office/drawing/2010/main" w="9525">
+                <a14:hiddenLine xmlns:a14="http://schemas.microsoft.com/office/drawing/2010/main" xmlns="" w="9525">
                   <a:solidFill>
                     <a:srgbClr val="000000"/>
                   </a:solidFill>
@@ -4163,7 +4179,7 @@
             </a:ln>
             <a:extLst>
               <a:ext uri="{91240B29-F687-4f45-9708-019B960494DF}">
-                <a14:hiddenLine xmlns="" xmlns:a14="http://schemas.microsoft.com/office/drawing/2010/main" w="9525">
+                <a14:hiddenLine xmlns:a14="http://schemas.microsoft.com/office/drawing/2010/main" xmlns="" w="9525">
                   <a:solidFill>
                     <a:srgbClr val="000000"/>
                   </a:solidFill>
@@ -4253,7 +4269,7 @@
             </a:ln>
             <a:extLst>
               <a:ext uri="{91240B29-F687-4f45-9708-019B960494DF}">
-                <a14:hiddenLine xmlns="" xmlns:a14="http://schemas.microsoft.com/office/drawing/2010/main" w="9525">
+                <a14:hiddenLine xmlns:a14="http://schemas.microsoft.com/office/drawing/2010/main" xmlns="" w="9525">
                   <a:solidFill>
                     <a:srgbClr val="000000"/>
                   </a:solidFill>
@@ -4456,7 +4472,7 @@
     </p:spTree>
     <p:extLst>
       <p:ext uri="{BB962C8B-B14F-4D97-AF65-F5344CB8AC3E}">
-        <p14:creationId xmlns:p14="http://schemas.microsoft.com/office/powerpoint/2010/main" xmlns="" val="3648695526"/>
+        <p14:creationId xmlns:p14="http://schemas.microsoft.com/office/powerpoint/2010/main" val="3648695526"/>
       </p:ext>
     </p:extLst>
   </p:cSld>
@@ -4715,7 +4731,7 @@
     </p:spTree>
     <p:extLst>
       <p:ext uri="{BB962C8B-B14F-4D97-AF65-F5344CB8AC3E}">
-        <p14:creationId xmlns:p14="http://schemas.microsoft.com/office/powerpoint/2010/main" xmlns="" val="1480870388"/>
+        <p14:creationId xmlns:p14="http://schemas.microsoft.com/office/powerpoint/2010/main" val="1480870388"/>
       </p:ext>
     </p:extLst>
   </p:cSld>
@@ -4913,7 +4929,7 @@
     </p:spTree>
     <p:extLst>
       <p:ext uri="{BB962C8B-B14F-4D97-AF65-F5344CB8AC3E}">
-        <p14:creationId xmlns:p14="http://schemas.microsoft.com/office/powerpoint/2010/main" xmlns="" val="3339303201"/>
+        <p14:creationId xmlns:p14="http://schemas.microsoft.com/office/powerpoint/2010/main" val="3339303201"/>
       </p:ext>
     </p:extLst>
   </p:cSld>
@@ -5416,7 +5432,7 @@
     </p:spTree>
     <p:extLst>
       <p:ext uri="{BB962C8B-B14F-4D97-AF65-F5344CB8AC3E}">
-        <p14:creationId xmlns:p14="http://schemas.microsoft.com/office/powerpoint/2010/main" xmlns="" val="996009270"/>
+        <p14:creationId xmlns:p14="http://schemas.microsoft.com/office/powerpoint/2010/main" val="996009270"/>
       </p:ext>
     </p:extLst>
   </p:cSld>
@@ -5614,7 +5630,7 @@
     </p:spTree>
     <p:extLst>
       <p:ext uri="{BB962C8B-B14F-4D97-AF65-F5344CB8AC3E}">
-        <p14:creationId xmlns:p14="http://schemas.microsoft.com/office/powerpoint/2010/main" xmlns="" val="1688706492"/>
+        <p14:creationId xmlns:p14="http://schemas.microsoft.com/office/powerpoint/2010/main" val="1688706492"/>
       </p:ext>
     </p:extLst>
   </p:cSld>
@@ -6162,7 +6178,7 @@
     </p:spTree>
     <p:extLst>
       <p:ext uri="{BB962C8B-B14F-4D97-AF65-F5344CB8AC3E}">
-        <p14:creationId xmlns:p14="http://schemas.microsoft.com/office/powerpoint/2010/main" xmlns="" val="288561965"/>
+        <p14:creationId xmlns:p14="http://schemas.microsoft.com/office/powerpoint/2010/main" val="288561965"/>
       </p:ext>
     </p:extLst>
   </p:cSld>
@@ -6884,7 +6900,7 @@
     </p:spTree>
     <p:extLst>
       <p:ext uri="{BB962C8B-B14F-4D97-AF65-F5344CB8AC3E}">
-        <p14:creationId xmlns:p14="http://schemas.microsoft.com/office/powerpoint/2010/main" xmlns="" val="3299492404"/>
+        <p14:creationId xmlns:p14="http://schemas.microsoft.com/office/powerpoint/2010/main" val="3299492404"/>
       </p:ext>
     </p:extLst>
   </p:cSld>
@@ -7056,7 +7072,7 @@
     </p:spTree>
     <p:extLst>
       <p:ext uri="{BB962C8B-B14F-4D97-AF65-F5344CB8AC3E}">
-        <p14:creationId xmlns:p14="http://schemas.microsoft.com/office/powerpoint/2010/main" xmlns="" val="1927692897"/>
+        <p14:creationId xmlns:p14="http://schemas.microsoft.com/office/powerpoint/2010/main" val="1927692897"/>
       </p:ext>
     </p:extLst>
   </p:cSld>
@@ -7238,7 +7254,7 @@
     </p:spTree>
     <p:extLst>
       <p:ext uri="{BB962C8B-B14F-4D97-AF65-F5344CB8AC3E}">
-        <p14:creationId xmlns:p14="http://schemas.microsoft.com/office/powerpoint/2010/main" xmlns="" val="2837041665"/>
+        <p14:creationId xmlns:p14="http://schemas.microsoft.com/office/powerpoint/2010/main" val="2837041665"/>
       </p:ext>
     </p:extLst>
   </p:cSld>
@@ -7410,7 +7426,7 @@
     </p:spTree>
     <p:extLst>
       <p:ext uri="{BB962C8B-B14F-4D97-AF65-F5344CB8AC3E}">
-        <p14:creationId xmlns:p14="http://schemas.microsoft.com/office/powerpoint/2010/main" xmlns="" val="2046456670"/>
+        <p14:creationId xmlns:p14="http://schemas.microsoft.com/office/powerpoint/2010/main" val="2046456670"/>
       </p:ext>
     </p:extLst>
   </p:cSld>
@@ -7662,7 +7678,7 @@
     </p:spTree>
     <p:extLst>
       <p:ext uri="{BB962C8B-B14F-4D97-AF65-F5344CB8AC3E}">
-        <p14:creationId xmlns:p14="http://schemas.microsoft.com/office/powerpoint/2010/main" xmlns="" val="1223601104"/>
+        <p14:creationId xmlns:p14="http://schemas.microsoft.com/office/powerpoint/2010/main" val="1223601104"/>
       </p:ext>
     </p:extLst>
   </p:cSld>
@@ -7896,7 +7912,7 @@
     </p:spTree>
     <p:extLst>
       <p:ext uri="{BB962C8B-B14F-4D97-AF65-F5344CB8AC3E}">
-        <p14:creationId xmlns:p14="http://schemas.microsoft.com/office/powerpoint/2010/main" xmlns="" val="1812601674"/>
+        <p14:creationId xmlns:p14="http://schemas.microsoft.com/office/powerpoint/2010/main" val="1812601674"/>
       </p:ext>
     </p:extLst>
   </p:cSld>
@@ -8279,7 +8295,7 @@
     </p:spTree>
     <p:extLst>
       <p:ext uri="{BB962C8B-B14F-4D97-AF65-F5344CB8AC3E}">
-        <p14:creationId xmlns:p14="http://schemas.microsoft.com/office/powerpoint/2010/main" xmlns="" val="476075052"/>
+        <p14:creationId xmlns:p14="http://schemas.microsoft.com/office/powerpoint/2010/main" val="476075052"/>
       </p:ext>
     </p:extLst>
   </p:cSld>
@@ -8399,7 +8415,7 @@
     </p:spTree>
     <p:extLst>
       <p:ext uri="{BB962C8B-B14F-4D97-AF65-F5344CB8AC3E}">
-        <p14:creationId xmlns:p14="http://schemas.microsoft.com/office/powerpoint/2010/main" xmlns="" val="172562120"/>
+        <p14:creationId xmlns:p14="http://schemas.microsoft.com/office/powerpoint/2010/main" val="172562120"/>
       </p:ext>
     </p:extLst>
   </p:cSld>
@@ -8496,7 +8512,7 @@
     </p:spTree>
     <p:extLst>
       <p:ext uri="{BB962C8B-B14F-4D97-AF65-F5344CB8AC3E}">
-        <p14:creationId xmlns:p14="http://schemas.microsoft.com/office/powerpoint/2010/main" xmlns="" val="2499867430"/>
+        <p14:creationId xmlns:p14="http://schemas.microsoft.com/office/powerpoint/2010/main" val="2499867430"/>
       </p:ext>
     </p:extLst>
   </p:cSld>
@@ -8747,7 +8763,7 @@
     </p:spTree>
     <p:extLst>
       <p:ext uri="{BB962C8B-B14F-4D97-AF65-F5344CB8AC3E}">
-        <p14:creationId xmlns:p14="http://schemas.microsoft.com/office/powerpoint/2010/main" xmlns="" val="328618379"/>
+        <p14:creationId xmlns:p14="http://schemas.microsoft.com/office/powerpoint/2010/main" val="328618379"/>
       </p:ext>
     </p:extLst>
   </p:cSld>
@@ -9029,7 +9045,7 @@
     </p:spTree>
     <p:extLst>
       <p:ext uri="{BB962C8B-B14F-4D97-AF65-F5344CB8AC3E}">
-        <p14:creationId xmlns:p14="http://schemas.microsoft.com/office/powerpoint/2010/main" xmlns="" val="3656980227"/>
+        <p14:creationId xmlns:p14="http://schemas.microsoft.com/office/powerpoint/2010/main" val="3656980227"/>
       </p:ext>
     </p:extLst>
   </p:cSld>
@@ -9074,7 +9090,7 @@
             <a:alphaModFix amt="30000"/>
             <a:extLst>
               <a:ext uri="{28A0092B-C50C-407E-A947-70E740481C1C}">
-                <a14:useLocalDpi xmlns:a14="http://schemas.microsoft.com/office/drawing/2010/main" xmlns="" val="0"/>
+                <a14:useLocalDpi xmlns:a14="http://schemas.microsoft.com/office/drawing/2010/main" val="0"/>
               </a:ext>
             </a:extLst>
           </a:blip>
@@ -9094,7 +9110,7 @@
           <a:noFill/>
           <a:extLst>
             <a:ext uri="{909E8E84-426E-40dd-AFC4-6F175D3DCCD1}">
-              <a14:hiddenFill xmlns="" xmlns:a14="http://schemas.microsoft.com/office/drawing/2010/main">
+              <a14:hiddenFill xmlns:a14="http://schemas.microsoft.com/office/drawing/2010/main" xmlns="">
                 <a:solidFill>
                   <a:srgbClr val="FFFFFF"/>
                 </a:solidFill>
@@ -9168,7 +9184,7 @@
               </a:ln>
               <a:extLst>
                 <a:ext uri="{91240B29-F687-4f45-9708-019B960494DF}">
-                  <a14:hiddenLine xmlns="" xmlns:a14="http://schemas.microsoft.com/office/drawing/2010/main" w="9525">
+                  <a14:hiddenLine xmlns:a14="http://schemas.microsoft.com/office/drawing/2010/main" xmlns="" w="9525">
                     <a:solidFill>
                       <a:srgbClr val="000000"/>
                     </a:solidFill>
@@ -9258,7 +9274,7 @@
               </a:ln>
               <a:extLst>
                 <a:ext uri="{91240B29-F687-4f45-9708-019B960494DF}">
-                  <a14:hiddenLine xmlns="" xmlns:a14="http://schemas.microsoft.com/office/drawing/2010/main" w="9525">
+                  <a14:hiddenLine xmlns:a14="http://schemas.microsoft.com/office/drawing/2010/main" xmlns="" w="9525">
                     <a:solidFill>
                       <a:srgbClr val="000000"/>
                     </a:solidFill>
@@ -9348,7 +9364,7 @@
               </a:ln>
               <a:extLst>
                 <a:ext uri="{91240B29-F687-4f45-9708-019B960494DF}">
-                  <a14:hiddenLine xmlns="" xmlns:a14="http://schemas.microsoft.com/office/drawing/2010/main" w="9525">
+                  <a14:hiddenLine xmlns:a14="http://schemas.microsoft.com/office/drawing/2010/main" xmlns="" w="9525">
                     <a:solidFill>
                       <a:srgbClr val="000000"/>
                     </a:solidFill>
@@ -9410,7 +9426,7 @@
               </a:ln>
               <a:extLst>
                 <a:ext uri="{91240B29-F687-4f45-9708-019B960494DF}">
-                  <a14:hiddenLine xmlns="" xmlns:a14="http://schemas.microsoft.com/office/drawing/2010/main" w="9525">
+                  <a14:hiddenLine xmlns:a14="http://schemas.microsoft.com/office/drawing/2010/main" xmlns="" w="9525">
                     <a:solidFill>
                       <a:srgbClr val="000000"/>
                     </a:solidFill>
@@ -9500,7 +9516,7 @@
               </a:ln>
               <a:extLst>
                 <a:ext uri="{91240B29-F687-4f45-9708-019B960494DF}">
-                  <a14:hiddenLine xmlns="" xmlns:a14="http://schemas.microsoft.com/office/drawing/2010/main" w="9525">
+                  <a14:hiddenLine xmlns:a14="http://schemas.microsoft.com/office/drawing/2010/main" xmlns="" w="9525">
                     <a:solidFill>
                       <a:srgbClr val="000000"/>
                     </a:solidFill>
@@ -9562,7 +9578,7 @@
               </a:ln>
               <a:extLst>
                 <a:ext uri="{91240B29-F687-4f45-9708-019B960494DF}">
-                  <a14:hiddenLine xmlns="" xmlns:a14="http://schemas.microsoft.com/office/drawing/2010/main" w="9525">
+                  <a14:hiddenLine xmlns:a14="http://schemas.microsoft.com/office/drawing/2010/main" xmlns="" w="9525">
                     <a:solidFill>
                       <a:srgbClr val="000000"/>
                     </a:solidFill>
@@ -9624,7 +9640,7 @@
               </a:ln>
               <a:extLst>
                 <a:ext uri="{91240B29-F687-4f45-9708-019B960494DF}">
-                  <a14:hiddenLine xmlns="" xmlns:a14="http://schemas.microsoft.com/office/drawing/2010/main" w="9525">
+                  <a14:hiddenLine xmlns:a14="http://schemas.microsoft.com/office/drawing/2010/main" xmlns="" w="9525">
                     <a:solidFill>
                       <a:srgbClr val="000000"/>
                     </a:solidFill>
@@ -9714,7 +9730,7 @@
               </a:ln>
               <a:extLst>
                 <a:ext uri="{91240B29-F687-4f45-9708-019B960494DF}">
-                  <a14:hiddenLine xmlns="" xmlns:a14="http://schemas.microsoft.com/office/drawing/2010/main" w="9525">
+                  <a14:hiddenLine xmlns:a14="http://schemas.microsoft.com/office/drawing/2010/main" xmlns="" w="9525">
                     <a:solidFill>
                       <a:srgbClr val="000000"/>
                     </a:solidFill>
@@ -9804,7 +9820,7 @@
               </a:ln>
               <a:extLst>
                 <a:ext uri="{91240B29-F687-4f45-9708-019B960494DF}">
-                  <a14:hiddenLine xmlns="" xmlns:a14="http://schemas.microsoft.com/office/drawing/2010/main" w="9525">
+                  <a14:hiddenLine xmlns:a14="http://schemas.microsoft.com/office/drawing/2010/main" xmlns="" w="9525">
                     <a:solidFill>
                       <a:srgbClr val="000000"/>
                     </a:solidFill>
@@ -9866,7 +9882,7 @@
               </a:ln>
               <a:extLst>
                 <a:ext uri="{91240B29-F687-4f45-9708-019B960494DF}">
-                  <a14:hiddenLine xmlns="" xmlns:a14="http://schemas.microsoft.com/office/drawing/2010/main" w="9525">
+                  <a14:hiddenLine xmlns:a14="http://schemas.microsoft.com/office/drawing/2010/main" xmlns="" w="9525">
                     <a:solidFill>
                       <a:srgbClr val="000000"/>
                     </a:solidFill>
@@ -9976,7 +9992,7 @@
               </a:ln>
               <a:extLst>
                 <a:ext uri="{91240B29-F687-4f45-9708-019B960494DF}">
-                  <a14:hiddenLine xmlns="" xmlns:a14="http://schemas.microsoft.com/office/drawing/2010/main" w="9525">
+                  <a14:hiddenLine xmlns:a14="http://schemas.microsoft.com/office/drawing/2010/main" xmlns="" w="9525">
                     <a:solidFill>
                       <a:srgbClr val="000000"/>
                     </a:solidFill>
@@ -10060,7 +10076,7 @@
               </a:ln>
               <a:extLst>
                 <a:ext uri="{91240B29-F687-4f45-9708-019B960494DF}">
-                  <a14:hiddenLine xmlns="" xmlns:a14="http://schemas.microsoft.com/office/drawing/2010/main" w="9525">
+                  <a14:hiddenLine xmlns:a14="http://schemas.microsoft.com/office/drawing/2010/main" xmlns="" w="9525">
                     <a:solidFill>
                       <a:srgbClr val="000000"/>
                     </a:solidFill>
@@ -10122,7 +10138,7 @@
               </a:ln>
               <a:extLst>
                 <a:ext uri="{91240B29-F687-4f45-9708-019B960494DF}">
-                  <a14:hiddenLine xmlns="" xmlns:a14="http://schemas.microsoft.com/office/drawing/2010/main" w="9525">
+                  <a14:hiddenLine xmlns:a14="http://schemas.microsoft.com/office/drawing/2010/main" xmlns="" w="9525">
                     <a:solidFill>
                       <a:srgbClr val="000000"/>
                     </a:solidFill>
@@ -10184,7 +10200,7 @@
               </a:ln>
               <a:extLst>
                 <a:ext uri="{91240B29-F687-4f45-9708-019B960494DF}">
-                  <a14:hiddenLine xmlns="" xmlns:a14="http://schemas.microsoft.com/office/drawing/2010/main" w="9525">
+                  <a14:hiddenLine xmlns:a14="http://schemas.microsoft.com/office/drawing/2010/main" xmlns="" w="9525">
                     <a:solidFill>
                       <a:srgbClr val="000000"/>
                     </a:solidFill>
@@ -10274,7 +10290,7 @@
               </a:ln>
               <a:extLst>
                 <a:ext uri="{91240B29-F687-4f45-9708-019B960494DF}">
-                  <a14:hiddenLine xmlns="" xmlns:a14="http://schemas.microsoft.com/office/drawing/2010/main" w="9525">
+                  <a14:hiddenLine xmlns:a14="http://schemas.microsoft.com/office/drawing/2010/main" xmlns="" w="9525">
                     <a:solidFill>
                       <a:srgbClr val="000000"/>
                     </a:solidFill>
@@ -10308,7 +10324,7 @@
               </a:ln>
               <a:extLst>
                 <a:ext uri="{91240B29-F687-4f45-9708-019B960494DF}">
-                  <a14:hiddenLine xmlns="" xmlns:a14="http://schemas.microsoft.com/office/drawing/2010/main" w="9525">
+                  <a14:hiddenLine xmlns:a14="http://schemas.microsoft.com/office/drawing/2010/main" xmlns="" w="9525">
                     <a:solidFill>
                       <a:srgbClr val="000000"/>
                     </a:solidFill>
@@ -10373,7 +10389,7 @@
               </a:ln>
               <a:extLst>
                 <a:ext uri="{91240B29-F687-4f45-9708-019B960494DF}">
-                  <a14:hiddenLine xmlns="" xmlns:a14="http://schemas.microsoft.com/office/drawing/2010/main" w="9525">
+                  <a14:hiddenLine xmlns:a14="http://schemas.microsoft.com/office/drawing/2010/main" xmlns="" w="9525">
                     <a:solidFill>
                       <a:srgbClr val="000000"/>
                     </a:solidFill>
@@ -10463,7 +10479,7 @@
               </a:ln>
               <a:extLst>
                 <a:ext uri="{91240B29-F687-4f45-9708-019B960494DF}">
-                  <a14:hiddenLine xmlns="" xmlns:a14="http://schemas.microsoft.com/office/drawing/2010/main" w="9525">
+                  <a14:hiddenLine xmlns:a14="http://schemas.microsoft.com/office/drawing/2010/main" xmlns="" w="9525">
                     <a:solidFill>
                       <a:srgbClr val="000000"/>
                     </a:solidFill>
@@ -10525,7 +10541,7 @@
               </a:ln>
               <a:extLst>
                 <a:ext uri="{91240B29-F687-4f45-9708-019B960494DF}">
-                  <a14:hiddenLine xmlns="" xmlns:a14="http://schemas.microsoft.com/office/drawing/2010/main" w="9525">
+                  <a14:hiddenLine xmlns:a14="http://schemas.microsoft.com/office/drawing/2010/main" xmlns="" w="9525">
                     <a:solidFill>
                       <a:srgbClr val="000000"/>
                     </a:solidFill>
@@ -10615,7 +10631,7 @@
               </a:ln>
               <a:extLst>
                 <a:ext uri="{91240B29-F687-4f45-9708-019B960494DF}">
-                  <a14:hiddenLine xmlns="" xmlns:a14="http://schemas.microsoft.com/office/drawing/2010/main" w="9525">
+                  <a14:hiddenLine xmlns:a14="http://schemas.microsoft.com/office/drawing/2010/main" xmlns="" w="9525">
                     <a:solidFill>
                       <a:srgbClr val="000000"/>
                     </a:solidFill>
@@ -10680,7 +10696,7 @@
               </a:ln>
               <a:extLst>
                 <a:ext uri="{91240B29-F687-4f45-9708-019B960494DF}">
-                  <a14:hiddenLine xmlns="" xmlns:a14="http://schemas.microsoft.com/office/drawing/2010/main" w="9525">
+                  <a14:hiddenLine xmlns:a14="http://schemas.microsoft.com/office/drawing/2010/main" xmlns="" w="9525">
                     <a:solidFill>
                       <a:srgbClr val="000000"/>
                     </a:solidFill>
@@ -10742,7 +10758,7 @@
               </a:ln>
               <a:extLst>
                 <a:ext uri="{91240B29-F687-4f45-9708-019B960494DF}">
-                  <a14:hiddenLine xmlns="" xmlns:a14="http://schemas.microsoft.com/office/drawing/2010/main" w="9525">
+                  <a14:hiddenLine xmlns:a14="http://schemas.microsoft.com/office/drawing/2010/main" xmlns="" w="9525">
                     <a:solidFill>
                       <a:srgbClr val="000000"/>
                     </a:solidFill>
@@ -10832,7 +10848,7 @@
               </a:ln>
               <a:extLst>
                 <a:ext uri="{91240B29-F687-4f45-9708-019B960494DF}">
-                  <a14:hiddenLine xmlns="" xmlns:a14="http://schemas.microsoft.com/office/drawing/2010/main" w="9525">
+                  <a14:hiddenLine xmlns:a14="http://schemas.microsoft.com/office/drawing/2010/main" xmlns="" w="9525">
                     <a:solidFill>
                       <a:srgbClr val="000000"/>
                     </a:solidFill>
@@ -10922,7 +10938,7 @@
               </a:ln>
               <a:extLst>
                 <a:ext uri="{91240B29-F687-4f45-9708-019B960494DF}">
-                  <a14:hiddenLine xmlns="" xmlns:a14="http://schemas.microsoft.com/office/drawing/2010/main" w="9525">
+                  <a14:hiddenLine xmlns:a14="http://schemas.microsoft.com/office/drawing/2010/main" xmlns="" w="9525">
                     <a:solidFill>
                       <a:srgbClr val="000000"/>
                     </a:solidFill>
@@ -10987,7 +11003,7 @@
               </a:ln>
               <a:extLst>
                 <a:ext uri="{91240B29-F687-4f45-9708-019B960494DF}">
-                  <a14:hiddenLine xmlns="" xmlns:a14="http://schemas.microsoft.com/office/drawing/2010/main" w="9525">
+                  <a14:hiddenLine xmlns:a14="http://schemas.microsoft.com/office/drawing/2010/main" xmlns="" w="9525">
                     <a:solidFill>
                       <a:srgbClr val="000000"/>
                     </a:solidFill>
@@ -11107,7 +11123,7 @@
               </a:ln>
               <a:extLst>
                 <a:ext uri="{91240B29-F687-4f45-9708-019B960494DF}">
-                  <a14:hiddenLine xmlns="" xmlns:a14="http://schemas.microsoft.com/office/drawing/2010/main" w="9525">
+                  <a14:hiddenLine xmlns:a14="http://schemas.microsoft.com/office/drawing/2010/main" xmlns="" w="9525">
                     <a:solidFill>
                       <a:srgbClr val="000000"/>
                     </a:solidFill>
@@ -11205,7 +11221,7 @@
               </a:ln>
               <a:extLst>
                 <a:ext uri="{91240B29-F687-4f45-9708-019B960494DF}">
-                  <a14:hiddenLine xmlns="" xmlns:a14="http://schemas.microsoft.com/office/drawing/2010/main" w="9525">
+                  <a14:hiddenLine xmlns:a14="http://schemas.microsoft.com/office/drawing/2010/main" xmlns="" w="9525">
                     <a:solidFill>
                       <a:srgbClr val="000000"/>
                     </a:solidFill>
@@ -11320,7 +11336,7 @@
               </a:ln>
               <a:extLst>
                 <a:ext uri="{91240B29-F687-4f45-9708-019B960494DF}">
-                  <a14:hiddenLine xmlns="" xmlns:a14="http://schemas.microsoft.com/office/drawing/2010/main" w="9525">
+                  <a14:hiddenLine xmlns:a14="http://schemas.microsoft.com/office/drawing/2010/main" xmlns="" w="9525">
                     <a:solidFill>
                       <a:srgbClr val="000000"/>
                     </a:solidFill>
@@ -11410,7 +11426,7 @@
               </a:ln>
               <a:extLst>
                 <a:ext uri="{91240B29-F687-4f45-9708-019B960494DF}">
-                  <a14:hiddenLine xmlns="" xmlns:a14="http://schemas.microsoft.com/office/drawing/2010/main" w="9525">
+                  <a14:hiddenLine xmlns:a14="http://schemas.microsoft.com/office/drawing/2010/main" xmlns="" w="9525">
                     <a:solidFill>
                       <a:srgbClr val="000000"/>
                     </a:solidFill>
@@ -11475,7 +11491,7 @@
               </a:ln>
               <a:extLst>
                 <a:ext uri="{91240B29-F687-4f45-9708-019B960494DF}">
-                  <a14:hiddenLine xmlns="" xmlns:a14="http://schemas.microsoft.com/office/drawing/2010/main" w="9525">
+                  <a14:hiddenLine xmlns:a14="http://schemas.microsoft.com/office/drawing/2010/main" xmlns="" w="9525">
                     <a:solidFill>
                       <a:srgbClr val="000000"/>
                     </a:solidFill>
@@ -11565,7 +11581,7 @@
               </a:ln>
               <a:extLst>
                 <a:ext uri="{91240B29-F687-4f45-9708-019B960494DF}">
-                  <a14:hiddenLine xmlns="" xmlns:a14="http://schemas.microsoft.com/office/drawing/2010/main" w="9525">
+                  <a14:hiddenLine xmlns:a14="http://schemas.microsoft.com/office/drawing/2010/main" xmlns="" w="9525">
                     <a:solidFill>
                       <a:srgbClr val="000000"/>
                     </a:solidFill>
@@ -11633,7 +11649,7 @@
               </a:ln>
               <a:extLst>
                 <a:ext uri="{91240B29-F687-4f45-9708-019B960494DF}">
-                  <a14:hiddenLine xmlns="" xmlns:a14="http://schemas.microsoft.com/office/drawing/2010/main" w="9525">
+                  <a14:hiddenLine xmlns:a14="http://schemas.microsoft.com/office/drawing/2010/main" xmlns="" w="9525">
                     <a:solidFill>
                       <a:srgbClr val="000000"/>
                     </a:solidFill>
@@ -11723,7 +11739,7 @@
               </a:ln>
               <a:extLst>
                 <a:ext uri="{91240B29-F687-4f45-9708-019B960494DF}">
-                  <a14:hiddenLine xmlns="" xmlns:a14="http://schemas.microsoft.com/office/drawing/2010/main" w="9525">
+                  <a14:hiddenLine xmlns:a14="http://schemas.microsoft.com/office/drawing/2010/main" xmlns="" w="9525">
                     <a:solidFill>
                       <a:srgbClr val="000000"/>
                     </a:solidFill>
@@ -11791,7 +11807,7 @@
               </a:ln>
               <a:extLst>
                 <a:ext uri="{91240B29-F687-4f45-9708-019B960494DF}">
-                  <a14:hiddenLine xmlns="" xmlns:a14="http://schemas.microsoft.com/office/drawing/2010/main" w="9525">
+                  <a14:hiddenLine xmlns:a14="http://schemas.microsoft.com/office/drawing/2010/main" xmlns="" w="9525">
                     <a:solidFill>
                       <a:srgbClr val="000000"/>
                     </a:solidFill>
@@ -11881,7 +11897,7 @@
               </a:ln>
               <a:extLst>
                 <a:ext uri="{91240B29-F687-4f45-9708-019B960494DF}">
-                  <a14:hiddenLine xmlns="" xmlns:a14="http://schemas.microsoft.com/office/drawing/2010/main" w="9525">
+                  <a14:hiddenLine xmlns:a14="http://schemas.microsoft.com/office/drawing/2010/main" xmlns="" w="9525">
                     <a:solidFill>
                       <a:srgbClr val="000000"/>
                     </a:solidFill>
@@ -11915,7 +11931,7 @@
               </a:ln>
               <a:extLst>
                 <a:ext uri="{91240B29-F687-4f45-9708-019B960494DF}">
-                  <a14:hiddenLine xmlns="" xmlns:a14="http://schemas.microsoft.com/office/drawing/2010/main" w="9525">
+                  <a14:hiddenLine xmlns:a14="http://schemas.microsoft.com/office/drawing/2010/main" xmlns="" w="9525">
                     <a:solidFill>
                       <a:srgbClr val="000000"/>
                     </a:solidFill>
@@ -12144,7 +12160,7 @@
     </p:spTree>
     <p:extLst>
       <p:ext uri="{BB962C8B-B14F-4D97-AF65-F5344CB8AC3E}">
-        <p14:creationId xmlns:p14="http://schemas.microsoft.com/office/powerpoint/2010/main" xmlns="" val="1785982115"/>
+        <p14:creationId xmlns:p14="http://schemas.microsoft.com/office/powerpoint/2010/main" val="1785982115"/>
       </p:ext>
     </p:extLst>
   </p:cSld>
@@ -12551,47 +12567,7 @@
           <a:p>
             <a:r>
               <a:rPr lang="fr-FR" dirty="0" smtClean="0"/>
-              <a:t>ESTHEVENET –– </a:t>
-            </a:r>
-            <a:r>
-              <a:rPr lang="fr-FR" dirty="0" smtClean="0"/>
-              <a:t>FUSTER </a:t>
-            </a:r>
-            <a:r>
-              <a:rPr lang="fr-FR" dirty="0" smtClean="0"/>
-              <a:t>–– </a:t>
-            </a:r>
-            <a:r>
-              <a:rPr lang="fr-FR" dirty="0" smtClean="0"/>
-              <a:t>GACHA </a:t>
-            </a:r>
-            <a:r>
-              <a:rPr lang="fr-FR" dirty="0" smtClean="0"/>
-              <a:t>––</a:t>
-            </a:r>
-            <a:r>
-              <a:rPr lang="fr-FR" dirty="0" smtClean="0"/>
-              <a:t> </a:t>
-            </a:r>
-            <a:r>
-              <a:rPr lang="fr-FR" dirty="0" smtClean="0"/>
-              <a:t>HEMON –– </a:t>
-            </a:r>
-            <a:r>
-              <a:rPr lang="fr-FR" dirty="0" smtClean="0"/>
-              <a:t>IVARS </a:t>
-            </a:r>
-            <a:r>
-              <a:rPr lang="fr-FR" dirty="0" smtClean="0"/>
-              <a:t>––</a:t>
-            </a:r>
-            <a:r>
-              <a:rPr lang="fr-FR" dirty="0" smtClean="0"/>
-              <a:t> PERRIN </a:t>
-            </a:r>
-            <a:r>
-              <a:rPr lang="fr-FR" dirty="0" smtClean="0"/>
-              <a:t>–– ROUZIC</a:t>
+              <a:t>ESTHEVENET –– FUSTER –– GACHA –– HEMON –– IVARS –– PERRIN –– ROUZIC</a:t>
             </a:r>
             <a:endParaRPr lang="fr-FR" dirty="0"/>
           </a:p>
@@ -12600,7 +12576,7 @@
     </p:spTree>
     <p:extLst>
       <p:ext uri="{BB962C8B-B14F-4D97-AF65-F5344CB8AC3E}">
-        <p14:creationId xmlns:p14="http://schemas.microsoft.com/office/powerpoint/2010/main" xmlns="" val="3638548848"/>
+        <p14:creationId xmlns:p14="http://schemas.microsoft.com/office/powerpoint/2010/main" val="3638548848"/>
       </p:ext>
     </p:extLst>
   </p:cSld>
@@ -12706,7 +12682,7 @@
     </p:spTree>
     <p:extLst>
       <p:ext uri="{BB962C8B-B14F-4D97-AF65-F5344CB8AC3E}">
-        <p14:creationId xmlns:p14="http://schemas.microsoft.com/office/powerpoint/2010/main" xmlns="" val="1069310357"/>
+        <p14:creationId xmlns:p14="http://schemas.microsoft.com/office/powerpoint/2010/main" val="1069310357"/>
       </p:ext>
     </p:extLst>
   </p:cSld>
@@ -12817,7 +12793,7 @@
     </p:spTree>
     <p:extLst>
       <p:ext uri="{BB962C8B-B14F-4D97-AF65-F5344CB8AC3E}">
-        <p14:creationId xmlns:p14="http://schemas.microsoft.com/office/powerpoint/2010/main" xmlns="" val="1069310357"/>
+        <p14:creationId xmlns:p14="http://schemas.microsoft.com/office/powerpoint/2010/main" val="1069310357"/>
       </p:ext>
     </p:extLst>
   </p:cSld>
@@ -12908,34 +12884,27 @@
           <a:p>
             <a:r>
               <a:rPr lang="fr-FR" dirty="0" smtClean="0"/>
-              <a:t>Implantation des algorithmes de vote en </a:t>
-            </a:r>
-            <a:r>
-              <a:rPr lang="fr-FR" dirty="0" smtClean="0"/>
-              <a:t>Java</a:t>
-            </a:r>
-            <a:endParaRPr lang="fr-FR" dirty="0" smtClean="0"/>
+              <a:t>Implantation des algorithmes de vote en Java</a:t>
+            </a:r>
           </a:p>
           <a:p>
             <a:r>
               <a:rPr lang="fr-FR" dirty="0" smtClean="0"/>
               <a:t>Établissement du MCD</a:t>
             </a:r>
-            <a:endParaRPr lang="fr-FR" dirty="0" smtClean="0"/>
           </a:p>
           <a:p>
             <a:r>
               <a:rPr lang="fr-FR" dirty="0" smtClean="0"/>
               <a:t>Mise en place du VPS</a:t>
             </a:r>
-            <a:endParaRPr lang="fr-FR" dirty="0" smtClean="0"/>
           </a:p>
         </p:txBody>
       </p:sp>
     </p:spTree>
     <p:extLst>
       <p:ext uri="{BB962C8B-B14F-4D97-AF65-F5344CB8AC3E}">
-        <p14:creationId xmlns:p14="http://schemas.microsoft.com/office/powerpoint/2010/main" xmlns="" val="1828497920"/>
+        <p14:creationId xmlns:p14="http://schemas.microsoft.com/office/powerpoint/2010/main" val="1828497920"/>
       </p:ext>
     </p:extLst>
   </p:cSld>
@@ -13052,7 +13021,7 @@
     </p:spTree>
     <p:extLst>
       <p:ext uri="{BB962C8B-B14F-4D97-AF65-F5344CB8AC3E}">
-        <p14:creationId xmlns:p14="http://schemas.microsoft.com/office/powerpoint/2010/main" xmlns="" val="1069310357"/>
+        <p14:creationId xmlns:p14="http://schemas.microsoft.com/office/powerpoint/2010/main" val="1069310357"/>
       </p:ext>
     </p:extLst>
   </p:cSld>
@@ -13214,7 +13183,7 @@
     </p:spTree>
     <p:extLst>
       <p:ext uri="{BB962C8B-B14F-4D97-AF65-F5344CB8AC3E}">
-        <p14:creationId xmlns:p14="http://schemas.microsoft.com/office/powerpoint/2010/main" xmlns="" val="1069310357"/>
+        <p14:creationId xmlns:p14="http://schemas.microsoft.com/office/powerpoint/2010/main" val="1069310357"/>
       </p:ext>
     </p:extLst>
   </p:cSld>
@@ -13343,7 +13312,7 @@
     </p:spTree>
     <p:extLst>
       <p:ext uri="{BB962C8B-B14F-4D97-AF65-F5344CB8AC3E}">
-        <p14:creationId xmlns:p14="http://schemas.microsoft.com/office/powerpoint/2010/main" xmlns="" val="1069310357"/>
+        <p14:creationId xmlns:p14="http://schemas.microsoft.com/office/powerpoint/2010/main" val="1069310357"/>
       </p:ext>
     </p:extLst>
   </p:cSld>
@@ -13436,27 +13405,30 @@
           <a:p>
             <a:r>
               <a:rPr lang="fr-FR" dirty="0" smtClean="0"/>
-              <a:t>Difficultés rencontrées</a:t>
+              <a:t>Parcours des votes </a:t>
             </a:r>
           </a:p>
           <a:p>
             <a:r>
               <a:rPr lang="fr-FR" dirty="0" smtClean="0"/>
-              <a:t>Solutions trouvées</a:t>
+              <a:t>Sélection des élus ou d’un éliminé</a:t>
             </a:r>
           </a:p>
           <a:p>
             <a:r>
               <a:rPr lang="fr-FR" dirty="0" smtClean="0"/>
-              <a:t>Améliorations à implémenter</a:t>
-            </a:r>
+              <a:t>Répartition du surplus de voix</a:t>
+            </a:r>
+          </a:p>
+          <a:p>
+            <a:endParaRPr lang="fr-FR" dirty="0" smtClean="0"/>
           </a:p>
         </p:txBody>
       </p:sp>
     </p:spTree>
     <p:extLst>
       <p:ext uri="{BB962C8B-B14F-4D97-AF65-F5344CB8AC3E}">
-        <p14:creationId xmlns:p14="http://schemas.microsoft.com/office/powerpoint/2010/main" xmlns="" val="1069310357"/>
+        <p14:creationId xmlns:p14="http://schemas.microsoft.com/office/powerpoint/2010/main" val="1069310357"/>
       </p:ext>
     </p:extLst>
   </p:cSld>
@@ -13573,7 +13545,7 @@
     </p:spTree>
     <p:extLst>
       <p:ext uri="{BB962C8B-B14F-4D97-AF65-F5344CB8AC3E}">
-        <p14:creationId xmlns:p14="http://schemas.microsoft.com/office/powerpoint/2010/main" xmlns="" val="1069310357"/>
+        <p14:creationId xmlns:p14="http://schemas.microsoft.com/office/powerpoint/2010/main" val="1069310357"/>
       </p:ext>
     </p:extLst>
   </p:cSld>
@@ -13686,7 +13658,7 @@
     </p:spTree>
     <p:extLst>
       <p:ext uri="{BB962C8B-B14F-4D97-AF65-F5344CB8AC3E}">
-        <p14:creationId xmlns:p14="http://schemas.microsoft.com/office/powerpoint/2010/main" xmlns="" val="1069310357"/>
+        <p14:creationId xmlns:p14="http://schemas.microsoft.com/office/powerpoint/2010/main" val="1069310357"/>
       </p:ext>
     </p:extLst>
   </p:cSld>
@@ -13775,7 +13747,7 @@
     </p:spTree>
     <p:extLst>
       <p:ext uri="{BB962C8B-B14F-4D97-AF65-F5344CB8AC3E}">
-        <p14:creationId xmlns:p14="http://schemas.microsoft.com/office/powerpoint/2010/main" xmlns="" val="1069310357"/>
+        <p14:creationId xmlns:p14="http://schemas.microsoft.com/office/powerpoint/2010/main" val="1069310357"/>
       </p:ext>
     </p:extLst>
   </p:cSld>
@@ -14037,7 +14009,7 @@
   <a:extraClrSchemeLst/>
   <a:extLst>
     <a:ext uri="{05A4C25C-085E-4340-85A3-A5531E510DB2}">
-      <thm15:themeFamily xmlns:thm15="http://schemas.microsoft.com/office/thememl/2012/main" xmlns="" name="Circuit" id="{0AC2F7E7-15F5-431C-B2A2-456FE929F56C}" vid="{0911B802-464C-4241-8DD9-B60FF88E379F}"/>
+      <thm15:themeFamily xmlns:thm15="http://schemas.microsoft.com/office/thememl/2012/main" name="Circuit" id="{0AC2F7E7-15F5-431C-B2A2-456FE929F56C}" vid="{0911B802-464C-4241-8DD9-B60FF88E379F}"/>
     </a:ext>
   </a:extLst>
 </a:theme>

</xml_diff>